<commit_message>
finishing touches on PPP
</commit_message>
<xml_diff>
--- a/presentation/NFTonation.pptx
+++ b/presentation/NFTonation.pptx
@@ -5,10 +5,10 @@
     <p:sldMasterId id="2147483684" r:id="rId4"/>
   </p:sldMasterIdLst>
   <p:notesMasterIdLst>
-    <p:notesMasterId r:id="rId13"/>
+    <p:notesMasterId r:id="rId14"/>
   </p:notesMasterIdLst>
   <p:handoutMasterIdLst>
-    <p:handoutMasterId r:id="rId14"/>
+    <p:handoutMasterId r:id="rId15"/>
   </p:handoutMasterIdLst>
   <p:sldIdLst>
     <p:sldId id="257" r:id="rId5"/>
@@ -18,7 +18,8 @@
     <p:sldId id="396" r:id="rId9"/>
     <p:sldId id="390" r:id="rId10"/>
     <p:sldId id="399" r:id="rId11"/>
-    <p:sldId id="398" r:id="rId12"/>
+    <p:sldId id="400" r:id="rId12"/>
+    <p:sldId id="398" r:id="rId13"/>
   </p:sldIdLst>
   <p:sldSz cx="12192000" cy="6858000"/>
   <p:notesSz cx="6858000" cy="9144000"/>
@@ -233,7 +234,7 @@
           <a:p>
             <a:fld id="{C17F2C1D-F243-42AB-ADF2-E7CB4E04900E}" type="datetimeFigureOut">
               <a:rPr lang="en-US" smtClean="0"/>
-              <a:t>12/7/22</a:t>
+              <a:t>12/13/2022</a:t>
             </a:fld>
             <a:endParaRPr lang="en-US"/>
           </a:p>
@@ -410,7 +411,7 @@
           <a:p>
             <a:fld id="{020CE34E-5667-4A32-A6BA-10C7A552BC63}" type="datetimeFigureOut">
               <a:rPr lang="en-US" smtClean="0"/>
-              <a:t>12/7/22</a:t>
+              <a:t>12/13/2022</a:t>
             </a:fld>
             <a:endParaRPr lang="en-US"/>
           </a:p>
@@ -16084,6 +16085,313 @@
           <p:cNvPr id="2" name="Title 1">
             <a:extLst>
               <a:ext uri="{FF2B5EF4-FFF2-40B4-BE49-F238E27FC236}">
+                <a16:creationId xmlns:a16="http://schemas.microsoft.com/office/drawing/2014/main" id="{05AA2312-6CD0-BE07-9509-26264C72476A}"/>
+              </a:ext>
+            </a:extLst>
+          </p:cNvPr>
+          <p:cNvSpPr>
+            <a:spLocks noGrp="1"/>
+          </p:cNvSpPr>
+          <p:nvPr>
+            <p:ph type="title"/>
+          </p:nvPr>
+        </p:nvSpPr>
+        <p:spPr/>
+        <p:txBody>
+          <a:bodyPr/>
+          <a:lstStyle/>
+          <a:p>
+            <a:r>
+              <a:rPr lang="en-US" dirty="0" err="1"/>
+              <a:t>Erweiterbarkeit</a:t>
+            </a:r>
+            <a:r>
+              <a:rPr lang="en-US" dirty="0"/>
+              <a:t> </a:t>
+            </a:r>
+            <a:endParaRPr lang="de-DE" dirty="0"/>
+          </a:p>
+        </p:txBody>
+      </p:sp>
+      <p:sp>
+        <p:nvSpPr>
+          <p:cNvPr id="3" name="Content Placeholder 2">
+            <a:extLst>
+              <a:ext uri="{FF2B5EF4-FFF2-40B4-BE49-F238E27FC236}">
+                <a16:creationId xmlns:a16="http://schemas.microsoft.com/office/drawing/2014/main" id="{AF513B5A-6540-142D-93A8-E91B7C54D6C2}"/>
+              </a:ext>
+            </a:extLst>
+          </p:cNvPr>
+          <p:cNvSpPr>
+            <a:spLocks noGrp="1"/>
+          </p:cNvSpPr>
+          <p:nvPr>
+            <p:ph idx="1"/>
+          </p:nvPr>
+        </p:nvSpPr>
+        <p:spPr/>
+        <p:txBody>
+          <a:bodyPr/>
+          <a:lstStyle/>
+          <a:p>
+            <a:pPr algn="l">
+              <a:buFontTx/>
+              <a:buChar char="-"/>
+            </a:pPr>
+            <a:r>
+              <a:rPr lang="en-US" dirty="0" err="1">
+                <a:solidFill>
+                  <a:schemeClr val="tx1"/>
+                </a:solidFill>
+              </a:rPr>
+              <a:t>Mehr</a:t>
+            </a:r>
+            <a:r>
+              <a:rPr lang="en-US" dirty="0">
+                <a:solidFill>
+                  <a:schemeClr val="tx1"/>
+                </a:solidFill>
+              </a:rPr>
+              <a:t> </a:t>
+            </a:r>
+            <a:r>
+              <a:rPr lang="en-US" dirty="0" err="1">
+                <a:solidFill>
+                  <a:schemeClr val="tx1"/>
+                </a:solidFill>
+              </a:rPr>
+              <a:t>Organisationen</a:t>
+            </a:r>
+            <a:endParaRPr lang="en-US" dirty="0">
+              <a:solidFill>
+                <a:schemeClr val="tx1"/>
+              </a:solidFill>
+            </a:endParaRPr>
+          </a:p>
+          <a:p>
+            <a:pPr algn="l">
+              <a:buFontTx/>
+              <a:buChar char="-"/>
+            </a:pPr>
+            <a:r>
+              <a:rPr lang="en-US" dirty="0">
+                <a:solidFill>
+                  <a:schemeClr val="tx1"/>
+                </a:solidFill>
+              </a:rPr>
+              <a:t>NFT </a:t>
+            </a:r>
+            <a:r>
+              <a:rPr lang="en-US" dirty="0" err="1">
+                <a:solidFill>
+                  <a:schemeClr val="tx1"/>
+                </a:solidFill>
+              </a:rPr>
+              <a:t>mit</a:t>
+            </a:r>
+            <a:r>
+              <a:rPr lang="en-US" dirty="0">
+                <a:solidFill>
+                  <a:schemeClr val="tx1"/>
+                </a:solidFill>
+              </a:rPr>
+              <a:t> Bild</a:t>
+            </a:r>
+          </a:p>
+          <a:p>
+            <a:pPr algn="l">
+              <a:buFontTx/>
+              <a:buChar char="-"/>
+            </a:pPr>
+            <a:r>
+              <a:rPr lang="en-US" dirty="0">
+                <a:solidFill>
+                  <a:schemeClr val="tx1"/>
+                </a:solidFill>
+              </a:rPr>
+              <a:t>Spender können </a:t>
+            </a:r>
+            <a:r>
+              <a:rPr lang="en-US" dirty="0" err="1">
+                <a:solidFill>
+                  <a:schemeClr val="tx1"/>
+                </a:solidFill>
+              </a:rPr>
+              <a:t>über</a:t>
+            </a:r>
+            <a:r>
+              <a:rPr lang="en-US" dirty="0">
+                <a:solidFill>
+                  <a:schemeClr val="tx1"/>
+                </a:solidFill>
+              </a:rPr>
+              <a:t> NFT </a:t>
+            </a:r>
+            <a:r>
+              <a:rPr lang="en-US" dirty="0" err="1">
+                <a:solidFill>
+                  <a:schemeClr val="tx1"/>
+                </a:solidFill>
+              </a:rPr>
+              <a:t>abstimmen</a:t>
+            </a:r>
+            <a:endParaRPr lang="en-US" dirty="0">
+              <a:solidFill>
+                <a:schemeClr val="tx1"/>
+              </a:solidFill>
+            </a:endParaRPr>
+          </a:p>
+          <a:p>
+            <a:pPr algn="l">
+              <a:buFontTx/>
+              <a:buChar char="-"/>
+            </a:pPr>
+            <a:r>
+              <a:rPr lang="en-US" dirty="0">
+                <a:solidFill>
+                  <a:schemeClr val="tx1"/>
+                </a:solidFill>
+              </a:rPr>
+              <a:t>Website Design</a:t>
+            </a:r>
+          </a:p>
+          <a:p>
+            <a:pPr algn="l">
+              <a:buFontTx/>
+              <a:buChar char="-"/>
+            </a:pPr>
+            <a:r>
+              <a:rPr lang="de-DE" dirty="0">
+                <a:solidFill>
+                  <a:schemeClr val="tx1"/>
+                </a:solidFill>
+              </a:rPr>
+              <a:t>Blockchains und Wallets </a:t>
+            </a:r>
+          </a:p>
+        </p:txBody>
+      </p:sp>
+      <p:sp>
+        <p:nvSpPr>
+          <p:cNvPr id="4" name="Date Placeholder 3">
+            <a:extLst>
+              <a:ext uri="{FF2B5EF4-FFF2-40B4-BE49-F238E27FC236}">
+                <a16:creationId xmlns:a16="http://schemas.microsoft.com/office/drawing/2014/main" id="{E66697C1-7642-C2AA-4FF8-979A6610385A}"/>
+              </a:ext>
+            </a:extLst>
+          </p:cNvPr>
+          <p:cNvSpPr>
+            <a:spLocks noGrp="1"/>
+          </p:cNvSpPr>
+          <p:nvPr>
+            <p:ph type="dt" sz="half" idx="10"/>
+          </p:nvPr>
+        </p:nvSpPr>
+        <p:spPr/>
+        <p:txBody>
+          <a:bodyPr/>
+          <a:lstStyle/>
+          <a:p>
+            <a:r>
+              <a:rPr lang="de-CH"/>
+              <a:t>Wednesday, December 14, 2022</a:t>
+            </a:r>
+            <a:endParaRPr lang="en-US"/>
+          </a:p>
+        </p:txBody>
+      </p:sp>
+      <p:sp>
+        <p:nvSpPr>
+          <p:cNvPr id="5" name="Footer Placeholder 4">
+            <a:extLst>
+              <a:ext uri="{FF2B5EF4-FFF2-40B4-BE49-F238E27FC236}">
+                <a16:creationId xmlns:a16="http://schemas.microsoft.com/office/drawing/2014/main" id="{3AC97524-A41B-3545-AE31-A8470F1A2277}"/>
+              </a:ext>
+            </a:extLst>
+          </p:cNvPr>
+          <p:cNvSpPr>
+            <a:spLocks noGrp="1"/>
+          </p:cNvSpPr>
+          <p:nvPr>
+            <p:ph type="ftr" sz="quarter" idx="11"/>
+          </p:nvPr>
+        </p:nvSpPr>
+        <p:spPr/>
+        <p:txBody>
+          <a:bodyPr/>
+          <a:lstStyle/>
+          <a:p>
+            <a:r>
+              <a:rPr lang="en-US"/>
+              <a:t>Testat Blockchain</a:t>
+            </a:r>
+          </a:p>
+        </p:txBody>
+      </p:sp>
+      <p:sp>
+        <p:nvSpPr>
+          <p:cNvPr id="6" name="Slide Number Placeholder 5">
+            <a:extLst>
+              <a:ext uri="{FF2B5EF4-FFF2-40B4-BE49-F238E27FC236}">
+                <a16:creationId xmlns:a16="http://schemas.microsoft.com/office/drawing/2014/main" id="{2EEA68C0-1BF2-CD51-3D5D-49DB372046A8}"/>
+              </a:ext>
+            </a:extLst>
+          </p:cNvPr>
+          <p:cNvSpPr>
+            <a:spLocks noGrp="1"/>
+          </p:cNvSpPr>
+          <p:nvPr>
+            <p:ph type="sldNum" sz="quarter" idx="12"/>
+          </p:nvPr>
+        </p:nvSpPr>
+        <p:spPr/>
+        <p:txBody>
+          <a:bodyPr/>
+          <a:lstStyle/>
+          <a:p>
+            <a:fld id="{DBA1B0FB-D917-4C8C-928F-313BD683BF39}" type="slidenum">
+              <a:rPr lang="en-US" smtClean="0"/>
+              <a:t>8</a:t>
+            </a:fld>
+            <a:endParaRPr lang="en-US"/>
+          </a:p>
+        </p:txBody>
+      </p:sp>
+    </p:spTree>
+    <p:extLst>
+      <p:ext uri="{BB962C8B-B14F-4D97-AF65-F5344CB8AC3E}">
+        <p14:creationId xmlns:p14="http://schemas.microsoft.com/office/powerpoint/2010/main" val="2882785720"/>
+      </p:ext>
+    </p:extLst>
+  </p:cSld>
+  <p:clrMapOvr>
+    <a:masterClrMapping/>
+  </p:clrMapOvr>
+</p:sld>
+</file>
+
+<file path=ppt/slides/slide9.xml><?xml version="1.0" encoding="utf-8"?>
+<p:sld xmlns:a="http://schemas.openxmlformats.org/drawingml/2006/main" xmlns:r="http://schemas.openxmlformats.org/officeDocument/2006/relationships" xmlns:p="http://schemas.openxmlformats.org/presentationml/2006/main">
+  <p:cSld>
+    <p:spTree>
+      <p:nvGrpSpPr>
+        <p:cNvPr id="1" name=""/>
+        <p:cNvGrpSpPr/>
+        <p:nvPr/>
+      </p:nvGrpSpPr>
+      <p:grpSpPr>
+        <a:xfrm>
+          <a:off x="0" y="0"/>
+          <a:ext cx="0" cy="0"/>
+          <a:chOff x="0" y="0"/>
+          <a:chExt cx="0" cy="0"/>
+        </a:xfrm>
+      </p:grpSpPr>
+      <p:sp>
+        <p:nvSpPr>
+          <p:cNvPr id="2" name="Title 1">
+            <a:extLst>
+              <a:ext uri="{FF2B5EF4-FFF2-40B4-BE49-F238E27FC236}">
                 <a16:creationId xmlns:a16="http://schemas.microsoft.com/office/drawing/2014/main" id="{22242FC4-E642-3C24-3335-ECB2C12CA4F0}"/>
               </a:ext>
             </a:extLst>
@@ -16205,7 +16513,7 @@
           <a:p>
             <a:fld id="{DBA1B0FB-D917-4C8C-928F-313BD683BF39}" type="slidenum">
               <a:rPr lang="en-US" smtClean="0"/>
-              <a:t>8</a:t>
+              <a:t>9</a:t>
             </a:fld>
             <a:endParaRPr lang="en-US"/>
           </a:p>
@@ -17016,6 +17324,21 @@
 </file>
 
 <file path=customXml/item1.xml><?xml version="1.0" encoding="utf-8"?>
+<?mso-contentType ?>
+<FormTemplates xmlns="http://schemas.microsoft.com/sharepoint/v3/contenttype/forms">
+  <Display>DocumentLibraryForm</Display>
+  <Edit>DocumentLibraryForm</Edit>
+  <New>DocumentLibraryForm</New>
+</FormTemplates>
+</file>
+
+<file path=customXml/item2.xml><?xml version="1.0" encoding="utf-8"?>
+<p:properties xmlns:p="http://schemas.microsoft.com/office/2006/metadata/properties" xmlns:xsi="http://www.w3.org/2001/XMLSchema-instance" xmlns:pc="http://schemas.microsoft.com/office/infopath/2007/PartnerControls">
+  <documentManagement/>
+</p:properties>
+</file>
+
+<file path=customXml/item3.xml><?xml version="1.0" encoding="utf-8"?>
 <ct:contentTypeSchema xmlns:ct="http://schemas.microsoft.com/office/2006/metadata/contentType" xmlns:ma="http://schemas.microsoft.com/office/2006/metadata/properties/metaAttributes" ct:_="" ma:_="" ma:contentTypeName="Dokument" ma:contentTypeID="0x010100EB9A7F6EA9753444921A6447CFA7C83D" ma:contentTypeVersion="2" ma:contentTypeDescription="Ein neues Dokument erstellen." ma:contentTypeScope="" ma:versionID="9091a9880f8265573239eaab063a646a">
   <xsd:schema xmlns:xsd="http://www.w3.org/2001/XMLSchema" xmlns:xs="http://www.w3.org/2001/XMLSchema" xmlns:p="http://schemas.microsoft.com/office/2006/metadata/properties" xmlns:ns2="4f6796d2-2ff3-4de2-9ade-b0b950cad6cd" targetNamespace="http://schemas.microsoft.com/office/2006/metadata/properties" ma:root="true" ma:fieldsID="29f735661d48cab8b964fe413bb0d3bc" ns2:_="">
     <xsd:import namespace="4f6796d2-2ff3-4de2-9ade-b0b950cad6cd"/>
@@ -17147,35 +17470,10 @@
 </ct:contentTypeSchema>
 </file>
 
-<file path=customXml/item2.xml><?xml version="1.0" encoding="utf-8"?>
-<p:properties xmlns:p="http://schemas.microsoft.com/office/2006/metadata/properties" xmlns:xsi="http://www.w3.org/2001/XMLSchema-instance" xmlns:pc="http://schemas.microsoft.com/office/infopath/2007/PartnerControls">
-  <documentManagement/>
-</p:properties>
-</file>
-
-<file path=customXml/item3.xml><?xml version="1.0" encoding="utf-8"?>
-<?mso-contentType ?>
-<FormTemplates xmlns="http://schemas.microsoft.com/sharepoint/v3/contenttype/forms">
-  <Display>DocumentLibraryForm</Display>
-  <Edit>DocumentLibraryForm</Edit>
-  <New>DocumentLibraryForm</New>
-</FormTemplates>
-</file>
-
 <file path=customXml/itemProps1.xml><?xml version="1.0" encoding="utf-8"?>
-<ds:datastoreItem xmlns:ds="http://schemas.openxmlformats.org/officeDocument/2006/customXml" ds:itemID="{50735B88-FD02-4E2B-8CE3-76DDD83342B5}">
+<ds:datastoreItem xmlns:ds="http://schemas.openxmlformats.org/officeDocument/2006/customXml" ds:itemID="{904751AB-E840-446F-8D49-E697067EC887}">
   <ds:schemaRefs>
-    <ds:schemaRef ds:uri="http://schemas.microsoft.com/office/2006/metadata/contentType"/>
-    <ds:schemaRef ds:uri="http://schemas.microsoft.com/office/2006/metadata/properties/metaAttributes"/>
-    <ds:schemaRef ds:uri="http://www.w3.org/2001/XMLSchema"/>
-    <ds:schemaRef ds:uri="http://schemas.microsoft.com/office/2006/metadata/properties"/>
-    <ds:schemaRef ds:uri="4f6796d2-2ff3-4de2-9ade-b0b950cad6cd"/>
-    <ds:schemaRef ds:uri="http://schemas.microsoft.com/office/2006/documentManagement/types"/>
-    <ds:schemaRef ds:uri="http://schemas.microsoft.com/office/infopath/2007/PartnerControls"/>
-    <ds:schemaRef ds:uri="http://schemas.openxmlformats.org/package/2006/metadata/core-properties"/>
-    <ds:schemaRef ds:uri="http://purl.org/dc/elements/1.1/"/>
-    <ds:schemaRef ds:uri="http://purl.org/dc/terms/"/>
-    <ds:schemaRef ds:uri="http://schemas.microsoft.com/internal/obd"/>
+    <ds:schemaRef ds:uri="http://schemas.microsoft.com/sharepoint/v3/contenttype/forms"/>
   </ds:schemaRefs>
 </ds:datastoreItem>
 </file>
@@ -17198,9 +17496,19 @@
 </file>
 
 <file path=customXml/itemProps3.xml><?xml version="1.0" encoding="utf-8"?>
-<ds:datastoreItem xmlns:ds="http://schemas.openxmlformats.org/officeDocument/2006/customXml" ds:itemID="{904751AB-E840-446F-8D49-E697067EC887}">
+<ds:datastoreItem xmlns:ds="http://schemas.openxmlformats.org/officeDocument/2006/customXml" ds:itemID="{50735B88-FD02-4E2B-8CE3-76DDD83342B5}">
   <ds:schemaRefs>
-    <ds:schemaRef ds:uri="http://schemas.microsoft.com/sharepoint/v3/contenttype/forms"/>
+    <ds:schemaRef ds:uri="http://schemas.microsoft.com/office/2006/metadata/contentType"/>
+    <ds:schemaRef ds:uri="http://schemas.microsoft.com/office/2006/metadata/properties/metaAttributes"/>
+    <ds:schemaRef ds:uri="http://www.w3.org/2001/XMLSchema"/>
+    <ds:schemaRef ds:uri="http://schemas.microsoft.com/office/2006/metadata/properties"/>
+    <ds:schemaRef ds:uri="4f6796d2-2ff3-4de2-9ade-b0b950cad6cd"/>
+    <ds:schemaRef ds:uri="http://schemas.microsoft.com/office/2006/documentManagement/types"/>
+    <ds:schemaRef ds:uri="http://schemas.microsoft.com/office/infopath/2007/PartnerControls"/>
+    <ds:schemaRef ds:uri="http://schemas.openxmlformats.org/package/2006/metadata/core-properties"/>
+    <ds:schemaRef ds:uri="http://purl.org/dc/elements/1.1/"/>
+    <ds:schemaRef ds:uri="http://purl.org/dc/terms/"/>
+    <ds:schemaRef ds:uri="http://schemas.microsoft.com/internal/obd"/>
   </ds:schemaRefs>
 </ds:datastoreItem>
 </file>

</xml_diff>